<commit_message>
Removed Product Goal, since there is a dedicated file for it
</commit_message>
<xml_diff>
--- a/doku/Notre Projet.pptx
+++ b/doku/Notre Projet.pptx
@@ -11446,111 +11446,23 @@
             <p:ph type="title"/>
           </p:nvPr>
         </p:nvSpPr>
-        <p:spPr/>
-        <p:txBody>
-          <a:bodyPr/>
+        <p:spPr>
+          <a:xfrm>
+            <a:off x="645281" y="2839212"/>
+            <a:ext cx="6190488" cy="1179576"/>
+          </a:xfrm>
+        </p:spPr>
+        <p:txBody>
+          <a:bodyPr>
+            <a:normAutofit fontScale="90000"/>
+          </a:bodyPr>
           <a:lstStyle/>
           <a:p>
             <a:r>
               <a:rPr lang="en-US" sz="5400" dirty="0"/>
-              <a:t>Product Goal</a:t>
+              <a:t>Product Goal + DoD</a:t>
             </a:r>
             <a:endParaRPr lang="en-US" dirty="0"/>
-          </a:p>
-        </p:txBody>
-      </p:sp>
-      <p:sp>
-        <p:nvSpPr>
-          <p:cNvPr id="4" name="Content Placeholder 3">
-            <a:extLst>
-              <a:ext uri="{FF2B5EF4-FFF2-40B4-BE49-F238E27FC236}">
-                <a16:creationId xmlns:a16="http://schemas.microsoft.com/office/drawing/2014/main" id="{B0881FA9-F3B0-4912-B0E1-352094195C30}"/>
-              </a:ext>
-            </a:extLst>
-          </p:cNvPr>
-          <p:cNvSpPr>
-            <a:spLocks noGrp="1"/>
-          </p:cNvSpPr>
-          <p:nvPr>
-            <p:ph idx="1"/>
-          </p:nvPr>
-        </p:nvSpPr>
-        <p:spPr/>
-        <p:txBody>
-          <a:bodyPr/>
-          <a:lstStyle/>
-          <a:p>
-            <a:r>
-              <a:rPr lang="en-US" sz="2000" dirty="0"/>
-              <a:t>Our Goal was to create a Web Application, which allows you to Upload and thus share your (code) snippets. User management via Cookies and editing snippets are a must </a:t>
-            </a:r>
-            <a:r>
-              <a:rPr lang="en-US" sz="2000" dirty="0" err="1"/>
-              <a:t>aswell</a:t>
-            </a:r>
-            <a:r>
-              <a:rPr lang="en-US" sz="2000" dirty="0"/>
-              <a:t>.</a:t>
-            </a:r>
-          </a:p>
-          <a:p>
-            <a:endParaRPr lang="en-US" dirty="0"/>
-          </a:p>
-        </p:txBody>
-      </p:sp>
-      <p:sp>
-        <p:nvSpPr>
-          <p:cNvPr id="9" name="Date Placeholder 8">
-            <a:extLst>
-              <a:ext uri="{FF2B5EF4-FFF2-40B4-BE49-F238E27FC236}">
-                <a16:creationId xmlns:a16="http://schemas.microsoft.com/office/drawing/2014/main" id="{D45C472E-4078-40A0-83A2-652E8356EDCB}"/>
-              </a:ext>
-            </a:extLst>
-          </p:cNvPr>
-          <p:cNvSpPr>
-            <a:spLocks noGrp="1"/>
-          </p:cNvSpPr>
-          <p:nvPr>
-            <p:ph type="dt" sz="half" idx="10"/>
-          </p:nvPr>
-        </p:nvSpPr>
-        <p:spPr/>
-        <p:txBody>
-          <a:bodyPr/>
-          <a:lstStyle/>
-          <a:p>
-            <a:r>
-              <a:rPr lang="en-US" dirty="0"/>
-              <a:t>9/3/20XX</a:t>
-            </a:r>
-          </a:p>
-        </p:txBody>
-      </p:sp>
-      <p:sp>
-        <p:nvSpPr>
-          <p:cNvPr id="10" name="Footer Placeholder 9">
-            <a:extLst>
-              <a:ext uri="{FF2B5EF4-FFF2-40B4-BE49-F238E27FC236}">
-                <a16:creationId xmlns:a16="http://schemas.microsoft.com/office/drawing/2014/main" id="{A8C7C3A0-5E78-49C8-B8D4-F3DF62B2BC93}"/>
-              </a:ext>
-            </a:extLst>
-          </p:cNvPr>
-          <p:cNvSpPr>
-            <a:spLocks noGrp="1"/>
-          </p:cNvSpPr>
-          <p:nvPr>
-            <p:ph type="ftr" sz="quarter" idx="11"/>
-          </p:nvPr>
-        </p:nvSpPr>
-        <p:spPr/>
-        <p:txBody>
-          <a:bodyPr/>
-          <a:lstStyle/>
-          <a:p>
-            <a:r>
-              <a:rPr lang="en-US" dirty="0"/>
-              <a:t>Presentation Title</a:t>
-            </a:r>
           </a:p>
         </p:txBody>
       </p:sp>
@@ -12377,6 +12289,15 @@
 </file>
 
 <file path=customXml/item2.xml><?xml version="1.0" encoding="utf-8"?>
+<p:properties xmlns:p="http://schemas.microsoft.com/office/2006/metadata/properties" xmlns:xsi="http://www.w3.org/2001/XMLSchema-instance" xmlns:pc="http://schemas.microsoft.com/office/infopath/2007/PartnerControls">
+  <documentManagement>
+    <Status xmlns="71af3243-3dd4-4a8d-8c0d-dd76da1f02a5">Not started</Status>
+    <MediaServiceKeyPoints xmlns="71af3243-3dd4-4a8d-8c0d-dd76da1f02a5" xsi:nil="true"/>
+  </documentManagement>
+</p:properties>
+</file>
+
+<file path=customXml/item3.xml><?xml version="1.0" encoding="utf-8"?>
 <ct:contentTypeSchema xmlns:ct="http://schemas.microsoft.com/office/2006/metadata/contentType" xmlns:ma="http://schemas.microsoft.com/office/2006/metadata/properties/metaAttributes" ct:_="" ma:_="" ma:contentTypeName="Document" ma:contentTypeID="0x01010079F111ED35F8CC479449609E8A0923A6" ma:contentTypeVersion="12" ma:contentTypeDescription="Create a new document." ma:contentTypeScope="" ma:versionID="426e97fa315356fffbdcd9876fe988c2">
   <xsd:schema xmlns:xsd="http://www.w3.org/2001/XMLSchema" xmlns:xs="http://www.w3.org/2001/XMLSchema" xmlns:p="http://schemas.microsoft.com/office/2006/metadata/properties" xmlns:ns2="71af3243-3dd4-4a8d-8c0d-dd76da1f02a5" xmlns:ns3="16c05727-aa75-4e4a-9b5f-8a80a1165891" targetNamespace="http://schemas.microsoft.com/office/2006/metadata/properties" ma:root="true" ma:fieldsID="14b8f0def80e6d70ce3def20c90759ae" ns2:_="" ns3:_="">
     <xsd:import namespace="71af3243-3dd4-4a8d-8c0d-dd76da1f02a5"/>
@@ -12597,15 +12518,6 @@
 </ct:contentTypeSchema>
 </file>
 
-<file path=customXml/item3.xml><?xml version="1.0" encoding="utf-8"?>
-<p:properties xmlns:p="http://schemas.microsoft.com/office/2006/metadata/properties" xmlns:xsi="http://www.w3.org/2001/XMLSchema-instance" xmlns:pc="http://schemas.microsoft.com/office/infopath/2007/PartnerControls">
-  <documentManagement>
-    <Status xmlns="71af3243-3dd4-4a8d-8c0d-dd76da1f02a5">Not started</Status>
-    <MediaServiceKeyPoints xmlns="71af3243-3dd4-4a8d-8c0d-dd76da1f02a5" xsi:nil="true"/>
-  </documentManagement>
-</p:properties>
-</file>
-
 <file path=customXml/itemProps1.xml><?xml version="1.0" encoding="utf-8"?>
 <ds:datastoreItem xmlns:ds="http://schemas.openxmlformats.org/officeDocument/2006/customXml" ds:itemID="{3C8E00D1-8EA3-4E42-801D-0253E1EAFC21}">
   <ds:schemaRefs>
@@ -12615,6 +12527,16 @@
 </file>
 
 <file path=customXml/itemProps2.xml><?xml version="1.0" encoding="utf-8"?>
+<ds:datastoreItem xmlns:ds="http://schemas.openxmlformats.org/officeDocument/2006/customXml" ds:itemID="{99919F73-B6C2-4A43-95E2-833EC48925FE}">
+  <ds:schemaRefs>
+    <ds:schemaRef ds:uri="http://schemas.microsoft.com/office/2006/metadata/properties"/>
+    <ds:schemaRef ds:uri="http://schemas.microsoft.com/office/infopath/2007/PartnerControls"/>
+    <ds:schemaRef ds:uri="71af3243-3dd4-4a8d-8c0d-dd76da1f02a5"/>
+  </ds:schemaRefs>
+</ds:datastoreItem>
+</file>
+
+<file path=customXml/itemProps3.xml><?xml version="1.0" encoding="utf-8"?>
 <ds:datastoreItem xmlns:ds="http://schemas.openxmlformats.org/officeDocument/2006/customXml" ds:itemID="{ABC329F5-30EE-4BF7-AA2A-B837B51416B4}">
   <ds:schemaRefs>
     <ds:schemaRef ds:uri="http://schemas.microsoft.com/office/2006/metadata/contentType"/>
@@ -12631,14 +12553,4 @@
     <ds:schemaRef ds:uri="http://schemas.microsoft.com/internal/obd"/>
   </ds:schemaRefs>
 </ds:datastoreItem>
-</file>
-
-<file path=customXml/itemProps3.xml><?xml version="1.0" encoding="utf-8"?>
-<ds:datastoreItem xmlns:ds="http://schemas.openxmlformats.org/officeDocument/2006/customXml" ds:itemID="{99919F73-B6C2-4A43-95E2-833EC48925FE}">
-  <ds:schemaRefs>
-    <ds:schemaRef ds:uri="http://schemas.microsoft.com/office/2006/metadata/properties"/>
-    <ds:schemaRef ds:uri="http://schemas.microsoft.com/office/infopath/2007/PartnerControls"/>
-    <ds:schemaRef ds:uri="71af3243-3dd4-4a8d-8c0d-dd76da1f02a5"/>
-  </ds:schemaRefs>
-</ds:datastoreItem>
 </file>
</xml_diff>

<commit_message>
Added PD and updated PP
</commit_message>
<xml_diff>
--- a/doku/Notre Projet.pptx
+++ b/doku/Notre Projet.pptx
@@ -11336,8 +11336,8 @@
           <a:p>
             <a:pPr algn="r"/>
             <a:r>
-              <a:rPr lang="en-US"/>
-              <a:t>Scrum Artifacts</a:t>
+              <a:rPr lang="en-US" dirty="0"/>
+              <a:t>Scrum Artefacts</a:t>
             </a:r>
             <a:endParaRPr lang="en-US" sz="1800" dirty="0">
               <a:solidFill>
@@ -11448,7 +11448,7 @@
         </p:nvSpPr>
         <p:spPr>
           <a:xfrm>
-            <a:off x="645281" y="2839212"/>
+            <a:off x="678837" y="2017091"/>
             <a:ext cx="6190488" cy="1179576"/>
           </a:xfrm>
         </p:spPr>
@@ -11460,7 +11460,7 @@
           <a:p>
             <a:r>
               <a:rPr lang="en-US" sz="5400" dirty="0"/>
-              <a:t>Product Goal + DoD</a:t>
+              <a:t>Project Description</a:t>
             </a:r>
             <a:endParaRPr lang="en-US" dirty="0"/>
           </a:p>
@@ -11513,7 +11513,7 @@
           </p:nvPr>
         </p:nvPicPr>
         <p:blipFill>
-          <a:blip r:embed="rId2"/>
+          <a:blip r:embed="rId3"/>
           <a:srcRect/>
           <a:stretch>
             <a:fillRect/>
@@ -11521,6 +11521,69 @@
         </p:blipFill>
         <p:spPr/>
       </p:pic>
+      <p:graphicFrame>
+        <p:nvGraphicFramePr>
+          <p:cNvPr id="4" name="Object 3">
+            <a:extLst>
+              <a:ext uri="{FF2B5EF4-FFF2-40B4-BE49-F238E27FC236}">
+                <a16:creationId xmlns:a16="http://schemas.microsoft.com/office/drawing/2014/main" id="{962ACAD4-61EE-4CD8-8925-60B431091267}"/>
+              </a:ext>
+            </a:extLst>
+          </p:cNvPr>
+          <p:cNvGraphicFramePr>
+            <a:graphicFrameLocks noChangeAspect="1"/>
+          </p:cNvGraphicFramePr>
+          <p:nvPr>
+            <p:extLst>
+              <p:ext uri="{D42A27DB-BD31-4B8C-83A1-F6EECF244321}">
+                <p14:modId xmlns:p14="http://schemas.microsoft.com/office/powerpoint/2010/main" val="1460332377"/>
+              </p:ext>
+            </p:extLst>
+          </p:nvPr>
+        </p:nvGraphicFramePr>
+        <p:xfrm>
+          <a:off x="2352675" y="3429000"/>
+          <a:ext cx="3055314" cy="1116013"/>
+        </p:xfrm>
+        <a:graphic>
+          <a:graphicData uri="http://schemas.openxmlformats.org/presentationml/2006/ole">
+            <mc:AlternateContent xmlns:mc="http://schemas.openxmlformats.org/markup-compatibility/2006">
+              <mc:Choice xmlns:v="urn:schemas-microsoft-com:vml" Requires="v">
+                <p:oleObj spid="_x0000_s1026" name="Packager Shell Object" showAsIcon="1" r:id="rId4" imgW="1060200" imgH="387000" progId="Package">
+                  <p:embed/>
+                </p:oleObj>
+              </mc:Choice>
+              <mc:Fallback>
+                <p:oleObj name="Packager Shell Object" showAsIcon="1" r:id="rId4" imgW="1060200" imgH="387000" progId="Package">
+                  <p:embed/>
+                  <p:pic>
+                    <p:nvPicPr>
+                      <p:cNvPr id="0" name=""/>
+                      <p:cNvPicPr/>
+                      <p:nvPr/>
+                    </p:nvPicPr>
+                    <p:blipFill>
+                      <a:blip r:embed="rId5"/>
+                      <a:stretch>
+                        <a:fillRect/>
+                      </a:stretch>
+                    </p:blipFill>
+                    <p:spPr>
+                      <a:xfrm>
+                        <a:off x="2352675" y="3429000"/>
+                        <a:ext cx="3055314" cy="1116013"/>
+                      </a:xfrm>
+                      <a:prstGeom prst="rect">
+                        <a:avLst/>
+                      </a:prstGeom>
+                    </p:spPr>
+                  </p:pic>
+                </p:oleObj>
+              </mc:Fallback>
+            </mc:AlternateContent>
+          </a:graphicData>
+        </a:graphic>
+      </p:graphicFrame>
     </p:spTree>
     <p:extLst>
       <p:ext uri="{BB962C8B-B14F-4D97-AF65-F5344CB8AC3E}">
@@ -11662,7 +11725,7 @@
           </p:nvPr>
         </p:nvPicPr>
         <p:blipFill>
-          <a:blip r:embed="rId2"/>
+          <a:blip r:embed="rId3"/>
           <a:srcRect/>
           <a:stretch>
             <a:fillRect/>
@@ -11693,7 +11756,7 @@
           <a:p>
             <a:r>
               <a:rPr lang="en-US" dirty="0"/>
-              <a:t>Scrum Artifacts</a:t>
+              <a:t>Scrum Artefacts</a:t>
             </a:r>
             <a:endParaRPr lang="en-CH" dirty="0"/>
           </a:p>
@@ -11721,9 +11784,12 @@
           <a:lstStyle/>
           <a:p>
             <a:r>
-              <a:rPr lang="en-US" dirty="0"/>
+              <a:rPr lang="en-US" dirty="0">
+                <a:hlinkClick r:id="rId4"/>
+              </a:rPr>
               <a:t>Project Backlog</a:t>
             </a:r>
+            <a:endParaRPr lang="en-US" dirty="0"/>
           </a:p>
           <a:p>
             <a:r>
@@ -11733,10 +11799,15 @@
           </a:p>
           <a:p>
             <a:r>
-              <a:rPr lang="en-US"/>
+              <a:rPr lang="en-US" dirty="0"/>
               <a:t>Component Diagram</a:t>
             </a:r>
-            <a:endParaRPr lang="en-CH" dirty="0"/>
+          </a:p>
+          <a:p>
+            <a:r>
+              <a:rPr lang="en-US" dirty="0"/>
+              <a:t>Product Goal + DoD</a:t>
+            </a:r>
           </a:p>
         </p:txBody>
       </p:sp>
@@ -11770,6 +11841,201 @@
           </a:p>
         </p:txBody>
       </p:sp>
+      <p:graphicFrame>
+        <p:nvGraphicFramePr>
+          <p:cNvPr id="2" name="Object 1">
+            <a:extLst>
+              <a:ext uri="{FF2B5EF4-FFF2-40B4-BE49-F238E27FC236}">
+                <a16:creationId xmlns:a16="http://schemas.microsoft.com/office/drawing/2014/main" id="{828C82EF-0A93-4E36-85E5-422421EA771C}"/>
+              </a:ext>
+            </a:extLst>
+          </p:cNvPr>
+          <p:cNvGraphicFramePr>
+            <a:graphicFrameLocks noChangeAspect="1"/>
+          </p:cNvGraphicFramePr>
+          <p:nvPr>
+            <p:extLst>
+              <p:ext uri="{D42A27DB-BD31-4B8C-83A1-F6EECF244321}">
+                <p14:modId xmlns:p14="http://schemas.microsoft.com/office/powerpoint/2010/main" val="3445041622"/>
+              </p:ext>
+            </p:extLst>
+          </p:nvPr>
+        </p:nvGraphicFramePr>
+        <p:xfrm>
+          <a:off x="4881592" y="3312923"/>
+          <a:ext cx="809625" cy="387350"/>
+        </p:xfrm>
+        <a:graphic>
+          <a:graphicData uri="http://schemas.openxmlformats.org/presentationml/2006/ole">
+            <mc:AlternateContent xmlns:mc="http://schemas.openxmlformats.org/markup-compatibility/2006">
+              <mc:Choice xmlns:v="urn:schemas-microsoft-com:vml" Requires="v">
+                <p:oleObj spid="_x0000_s2050" name="Packager Shell Object" showAsIcon="1" r:id="rId5" imgW="809280" imgH="387000" progId="Package">
+                  <p:embed/>
+                </p:oleObj>
+              </mc:Choice>
+              <mc:Fallback>
+                <p:oleObj name="Packager Shell Object" showAsIcon="1" r:id="rId5" imgW="809280" imgH="387000" progId="Package">
+                  <p:embed/>
+                  <p:pic>
+                    <p:nvPicPr>
+                      <p:cNvPr id="0" name=""/>
+                      <p:cNvPicPr/>
+                      <p:nvPr/>
+                    </p:nvPicPr>
+                    <p:blipFill>
+                      <a:blip r:embed="rId6"/>
+                      <a:stretch>
+                        <a:fillRect/>
+                      </a:stretch>
+                    </p:blipFill>
+                    <p:spPr>
+                      <a:xfrm>
+                        <a:off x="4881592" y="3312923"/>
+                        <a:ext cx="809625" cy="387350"/>
+                      </a:xfrm>
+                      <a:prstGeom prst="rect">
+                        <a:avLst/>
+                      </a:prstGeom>
+                    </p:spPr>
+                  </p:pic>
+                </p:oleObj>
+              </mc:Fallback>
+            </mc:AlternateContent>
+          </a:graphicData>
+        </a:graphic>
+      </p:graphicFrame>
+      <p:graphicFrame>
+        <p:nvGraphicFramePr>
+          <p:cNvPr id="5" name="Object 4">
+            <a:extLst>
+              <a:ext uri="{FF2B5EF4-FFF2-40B4-BE49-F238E27FC236}">
+                <a16:creationId xmlns:a16="http://schemas.microsoft.com/office/drawing/2014/main" id="{4C135D3E-863A-4A4F-B9D3-D070616EC59F}"/>
+              </a:ext>
+            </a:extLst>
+          </p:cNvPr>
+          <p:cNvGraphicFramePr>
+            <a:graphicFrameLocks noChangeAspect="1"/>
+          </p:cNvGraphicFramePr>
+          <p:nvPr>
+            <p:extLst>
+              <p:ext uri="{D42A27DB-BD31-4B8C-83A1-F6EECF244321}">
+                <p14:modId xmlns:p14="http://schemas.microsoft.com/office/powerpoint/2010/main" val="3459955266"/>
+              </p:ext>
+            </p:extLst>
+          </p:nvPr>
+        </p:nvGraphicFramePr>
+        <p:xfrm>
+          <a:off x="4068763" y="3909619"/>
+          <a:ext cx="1331912" cy="387350"/>
+        </p:xfrm>
+        <a:graphic>
+          <a:graphicData uri="http://schemas.openxmlformats.org/presentationml/2006/ole">
+            <mc:AlternateContent xmlns:mc="http://schemas.openxmlformats.org/markup-compatibility/2006">
+              <mc:Choice xmlns:v="urn:schemas-microsoft-com:vml" Requires="v">
+                <p:oleObj spid="_x0000_s2051" name="Packager Shell Object" showAsIcon="1" r:id="rId7" imgW="1332360" imgH="387000" progId="Package">
+                  <p:embed/>
+                </p:oleObj>
+              </mc:Choice>
+              <mc:Fallback>
+                <p:oleObj name="Packager Shell Object" showAsIcon="1" r:id="rId7" imgW="1332360" imgH="387000" progId="Package">
+                  <p:embed/>
+                  <p:pic>
+                    <p:nvPicPr>
+                      <p:cNvPr id="0" name=""/>
+                      <p:cNvPicPr/>
+                      <p:nvPr/>
+                    </p:nvPicPr>
+                    <p:blipFill>
+                      <a:blip r:embed="rId8"/>
+                      <a:stretch>
+                        <a:fillRect/>
+                      </a:stretch>
+                    </p:blipFill>
+                    <p:spPr>
+                      <a:xfrm>
+                        <a:off x="4068763" y="3909619"/>
+                        <a:ext cx="1331912" cy="387350"/>
+                      </a:xfrm>
+                      <a:prstGeom prst="rect">
+                        <a:avLst/>
+                      </a:prstGeom>
+                    </p:spPr>
+                  </p:pic>
+                </p:oleObj>
+              </mc:Fallback>
+            </mc:AlternateContent>
+          </a:graphicData>
+        </a:graphic>
+      </p:graphicFrame>
+      <p:graphicFrame>
+        <p:nvGraphicFramePr>
+          <p:cNvPr id="8" name="Object 7">
+            <a:extLst>
+              <a:ext uri="{FF2B5EF4-FFF2-40B4-BE49-F238E27FC236}">
+                <a16:creationId xmlns:a16="http://schemas.microsoft.com/office/drawing/2014/main" id="{6543B987-D389-46D7-B5FA-DD01C2B7CD00}"/>
+              </a:ext>
+            </a:extLst>
+          </p:cNvPr>
+          <p:cNvGraphicFramePr>
+            <a:graphicFrameLocks noChangeAspect="1"/>
+          </p:cNvGraphicFramePr>
+          <p:nvPr>
+            <p:extLst>
+              <p:ext uri="{D42A27DB-BD31-4B8C-83A1-F6EECF244321}">
+                <p14:modId xmlns:p14="http://schemas.microsoft.com/office/powerpoint/2010/main" val="1717382260"/>
+              </p:ext>
+            </p:extLst>
+          </p:nvPr>
+        </p:nvGraphicFramePr>
+        <p:xfrm>
+          <a:off x="3928057" y="4299810"/>
+          <a:ext cx="1427611" cy="424284"/>
+        </p:xfrm>
+        <a:graphic>
+          <a:graphicData uri="http://schemas.openxmlformats.org/presentationml/2006/ole">
+            <mc:AlternateContent xmlns:mc="http://schemas.openxmlformats.org/markup-compatibility/2006">
+              <mc:Choice xmlns:v="urn:schemas-microsoft-com:vml" Requires="v">
+                <p:oleObj spid="_x0000_s2052" name="Packager Shell Object" showAsIcon="1" r:id="rId9" imgW="1303560" imgH="387000" progId="Package">
+                  <p:embed/>
+                </p:oleObj>
+              </mc:Choice>
+              <mc:Fallback>
+                <p:oleObj name="Packager Shell Object" showAsIcon="1" r:id="rId9" imgW="1303560" imgH="387000" progId="Package">
+                  <p:embed/>
+                  <p:pic>
+                    <p:nvPicPr>
+                      <p:cNvPr id="2" name="Object 1">
+                        <a:extLst>
+                          <a:ext uri="{FF2B5EF4-FFF2-40B4-BE49-F238E27FC236}">
+                            <a16:creationId xmlns:a16="http://schemas.microsoft.com/office/drawing/2014/main" id="{A134250F-44B7-4071-8560-09F361543064}"/>
+                          </a:ext>
+                        </a:extLst>
+                      </p:cNvPr>
+                      <p:cNvPicPr/>
+                      <p:nvPr/>
+                    </p:nvPicPr>
+                    <p:blipFill>
+                      <a:blip r:embed="rId10"/>
+                      <a:stretch>
+                        <a:fillRect/>
+                      </a:stretch>
+                    </p:blipFill>
+                    <p:spPr>
+                      <a:xfrm>
+                        <a:off x="3928057" y="4299810"/>
+                        <a:ext cx="1427611" cy="424284"/>
+                      </a:xfrm>
+                      <a:prstGeom prst="rect">
+                        <a:avLst/>
+                      </a:prstGeom>
+                    </p:spPr>
+                  </p:pic>
+                </p:oleObj>
+              </mc:Fallback>
+            </mc:AlternateContent>
+          </a:graphicData>
+        </a:graphic>
+      </p:graphicFrame>
     </p:spTree>
     <p:extLst>
       <p:ext uri="{BB962C8B-B14F-4D97-AF65-F5344CB8AC3E}">
@@ -12289,15 +12555,6 @@
 </file>
 
 <file path=customXml/item2.xml><?xml version="1.0" encoding="utf-8"?>
-<p:properties xmlns:p="http://schemas.microsoft.com/office/2006/metadata/properties" xmlns:xsi="http://www.w3.org/2001/XMLSchema-instance" xmlns:pc="http://schemas.microsoft.com/office/infopath/2007/PartnerControls">
-  <documentManagement>
-    <Status xmlns="71af3243-3dd4-4a8d-8c0d-dd76da1f02a5">Not started</Status>
-    <MediaServiceKeyPoints xmlns="71af3243-3dd4-4a8d-8c0d-dd76da1f02a5" xsi:nil="true"/>
-  </documentManagement>
-</p:properties>
-</file>
-
-<file path=customXml/item3.xml><?xml version="1.0" encoding="utf-8"?>
 <ct:contentTypeSchema xmlns:ct="http://schemas.microsoft.com/office/2006/metadata/contentType" xmlns:ma="http://schemas.microsoft.com/office/2006/metadata/properties/metaAttributes" ct:_="" ma:_="" ma:contentTypeName="Document" ma:contentTypeID="0x01010079F111ED35F8CC479449609E8A0923A6" ma:contentTypeVersion="12" ma:contentTypeDescription="Create a new document." ma:contentTypeScope="" ma:versionID="426e97fa315356fffbdcd9876fe988c2">
   <xsd:schema xmlns:xsd="http://www.w3.org/2001/XMLSchema" xmlns:xs="http://www.w3.org/2001/XMLSchema" xmlns:p="http://schemas.microsoft.com/office/2006/metadata/properties" xmlns:ns2="71af3243-3dd4-4a8d-8c0d-dd76da1f02a5" xmlns:ns3="16c05727-aa75-4e4a-9b5f-8a80a1165891" targetNamespace="http://schemas.microsoft.com/office/2006/metadata/properties" ma:root="true" ma:fieldsID="14b8f0def80e6d70ce3def20c90759ae" ns2:_="" ns3:_="">
     <xsd:import namespace="71af3243-3dd4-4a8d-8c0d-dd76da1f02a5"/>
@@ -12518,6 +12775,15 @@
 </ct:contentTypeSchema>
 </file>
 
+<file path=customXml/item3.xml><?xml version="1.0" encoding="utf-8"?>
+<p:properties xmlns:p="http://schemas.microsoft.com/office/2006/metadata/properties" xmlns:xsi="http://www.w3.org/2001/XMLSchema-instance" xmlns:pc="http://schemas.microsoft.com/office/infopath/2007/PartnerControls">
+  <documentManagement>
+    <Status xmlns="71af3243-3dd4-4a8d-8c0d-dd76da1f02a5">Not started</Status>
+    <MediaServiceKeyPoints xmlns="71af3243-3dd4-4a8d-8c0d-dd76da1f02a5" xsi:nil="true"/>
+  </documentManagement>
+</p:properties>
+</file>
+
 <file path=customXml/itemProps1.xml><?xml version="1.0" encoding="utf-8"?>
 <ds:datastoreItem xmlns:ds="http://schemas.openxmlformats.org/officeDocument/2006/customXml" ds:itemID="{3C8E00D1-8EA3-4E42-801D-0253E1EAFC21}">
   <ds:schemaRefs>
@@ -12527,16 +12793,6 @@
 </file>
 
 <file path=customXml/itemProps2.xml><?xml version="1.0" encoding="utf-8"?>
-<ds:datastoreItem xmlns:ds="http://schemas.openxmlformats.org/officeDocument/2006/customXml" ds:itemID="{99919F73-B6C2-4A43-95E2-833EC48925FE}">
-  <ds:schemaRefs>
-    <ds:schemaRef ds:uri="http://schemas.microsoft.com/office/2006/metadata/properties"/>
-    <ds:schemaRef ds:uri="http://schemas.microsoft.com/office/infopath/2007/PartnerControls"/>
-    <ds:schemaRef ds:uri="71af3243-3dd4-4a8d-8c0d-dd76da1f02a5"/>
-  </ds:schemaRefs>
-</ds:datastoreItem>
-</file>
-
-<file path=customXml/itemProps3.xml><?xml version="1.0" encoding="utf-8"?>
 <ds:datastoreItem xmlns:ds="http://schemas.openxmlformats.org/officeDocument/2006/customXml" ds:itemID="{ABC329F5-30EE-4BF7-AA2A-B837B51416B4}">
   <ds:schemaRefs>
     <ds:schemaRef ds:uri="http://schemas.microsoft.com/office/2006/metadata/contentType"/>
@@ -12553,4 +12809,14 @@
     <ds:schemaRef ds:uri="http://schemas.microsoft.com/internal/obd"/>
   </ds:schemaRefs>
 </ds:datastoreItem>
+</file>
+
+<file path=customXml/itemProps3.xml><?xml version="1.0" encoding="utf-8"?>
+<ds:datastoreItem xmlns:ds="http://schemas.openxmlformats.org/officeDocument/2006/customXml" ds:itemID="{99919F73-B6C2-4A43-95E2-833EC48925FE}">
+  <ds:schemaRefs>
+    <ds:schemaRef ds:uri="http://schemas.microsoft.com/office/2006/metadata/properties"/>
+    <ds:schemaRef ds:uri="http://schemas.microsoft.com/office/infopath/2007/PartnerControls"/>
+    <ds:schemaRef ds:uri="71af3243-3dd4-4a8d-8c0d-dd76da1f02a5"/>
+  </ds:schemaRefs>
+</ds:datastoreItem>
 </file>
</xml_diff>